<commit_message>
Updated Lab 2 Slides
</commit_message>
<xml_diff>
--- a/DSX/Lab-2/Lab2-MachineLearning.pptx
+++ b/DSX/Lab-2/Lab2-MachineLearning.pptx
@@ -326,7 +326,7 @@
               <a:pPr>
                 <a:defRPr/>
               </a:pPr>
-              <a:t>3/28/17</a:t>
+              <a:t>3/30/17</a:t>
             </a:fld>
             <a:endParaRPr lang="en-US" altLang="en-US"/>
           </a:p>
@@ -8506,7 +8506,7 @@
           <a:p>
             <a:fld id="{88C5A43A-D7F1-2D40-88D0-9AFC21143301}" type="datetime1">
               <a:rPr lang="en-US" smtClean="0"/>
-              <a:t>3/28/17</a:t>
+              <a:t>3/30/17</a:t>
             </a:fld>
             <a:endParaRPr lang="en-US" dirty="0"/>
           </a:p>
@@ -11869,7 +11869,7 @@
           <a:p>
             <a:fld id="{370407F8-A0DE-0548-8524-82115295947F}" type="datetime1">
               <a:rPr lang="en-US" smtClean="0"/>
-              <a:t>3/28/17</a:t>
+              <a:t>3/30/17</a:t>
             </a:fld>
             <a:endParaRPr lang="en-US" dirty="0"/>
           </a:p>
@@ -12025,7 +12025,7 @@
           <a:p>
             <a:fld id="{2862B59D-61C6-734D-B2FA-82ADFB6FECA2}" type="datetime1">
               <a:rPr lang="en-US" noProof="0" smtClean="0"/>
-              <a:t>3/28/17</a:t>
+              <a:t>3/30/17</a:t>
             </a:fld>
             <a:endParaRPr lang="en-US" noProof="0" dirty="0"/>
           </a:p>
@@ -12310,7 +12310,7 @@
           <a:p>
             <a:fld id="{2406264F-D4B1-EC4C-8C30-7F9F0D21D144}" type="datetime1">
               <a:rPr lang="en-US" smtClean="0"/>
-              <a:t>3/28/17</a:t>
+              <a:t>3/30/17</a:t>
             </a:fld>
             <a:endParaRPr lang="en-US" dirty="0"/>
           </a:p>
@@ -12548,7 +12548,7 @@
           <a:p>
             <a:fld id="{D2AADFED-D696-B14C-9F9D-4B709DB04A57}" type="datetime1">
               <a:rPr lang="en-US" smtClean="0"/>
-              <a:t>3/28/17</a:t>
+              <a:t>3/30/17</a:t>
             </a:fld>
             <a:endParaRPr lang="en-US" dirty="0"/>
           </a:p>
@@ -12842,7 +12842,7 @@
           <a:p>
             <a:fld id="{294C0549-033F-F04E-8BB8-1B3E52F5B6D7}" type="datetime1">
               <a:rPr lang="en-US" smtClean="0"/>
-              <a:t>3/28/17</a:t>
+              <a:t>3/30/17</a:t>
             </a:fld>
             <a:endParaRPr lang="en-US" dirty="0"/>
           </a:p>
@@ -13136,7 +13136,7 @@
           <a:p>
             <a:fld id="{DC020AAE-0E93-0646-88F8-B04482CD4A2C}" type="datetime1">
               <a:rPr lang="en-US" smtClean="0"/>
-              <a:t>3/28/17</a:t>
+              <a:t>3/30/17</a:t>
             </a:fld>
             <a:endParaRPr lang="en-US" dirty="0"/>
           </a:p>
@@ -13349,7 +13349,7 @@
           <a:p>
             <a:fld id="{91B44213-F620-F24C-A685-23884068C705}" type="datetime1">
               <a:rPr lang="en-US" smtClean="0"/>
-              <a:t>3/28/17</a:t>
+              <a:t>3/30/17</a:t>
             </a:fld>
             <a:endParaRPr lang="en-US" dirty="0"/>
           </a:p>
@@ -13535,7 +13535,7 @@
           <a:p>
             <a:fld id="{812CE4DF-5C59-FE41-87D9-FA30C439C712}" type="datetime1">
               <a:rPr lang="en-US" smtClean="0"/>
-              <a:t>3/28/17</a:t>
+              <a:t>3/30/17</a:t>
             </a:fld>
             <a:endParaRPr lang="en-US" dirty="0"/>
           </a:p>
@@ -13793,7 +13793,7 @@
           <a:p>
             <a:fld id="{0F2A9B07-2AD9-E04E-96EB-52640D3CE50E}" type="datetime1">
               <a:rPr lang="en-US" smtClean="0"/>
-              <a:t>3/28/17</a:t>
+              <a:t>3/30/17</a:t>
             </a:fld>
             <a:endParaRPr lang="en-US" dirty="0"/>
           </a:p>
@@ -14499,7 +14499,7 @@
           <a:p>
             <a:fld id="{C0E938FE-645F-2E40-8F8E-5332AAB7C030}" type="datetime1">
               <a:rPr lang="en-US" smtClean="0"/>
-              <a:t>3/28/17</a:t>
+              <a:t>3/30/17</a:t>
             </a:fld>
             <a:endParaRPr lang="en-US" dirty="0"/>
           </a:p>
@@ -15061,7 +15061,7 @@
           <a:p>
             <a:fld id="{F6569909-79EB-CD48-8A4A-5A8D23B2CF35}" type="datetime1">
               <a:rPr lang="en-US" smtClean="0"/>
-              <a:t>3/28/17</a:t>
+              <a:t>3/30/17</a:t>
             </a:fld>
             <a:endParaRPr lang="en-US" dirty="0"/>
           </a:p>
@@ -15247,7 +15247,7 @@
           <a:p>
             <a:fld id="{5F360B42-63B9-304D-8F7B-BA1B289E486A}" type="datetime1">
               <a:rPr lang="en-US" smtClean="0"/>
-              <a:t>3/28/17</a:t>
+              <a:t>3/30/17</a:t>
             </a:fld>
             <a:endParaRPr lang="en-US" dirty="0"/>
           </a:p>
@@ -15579,7 +15579,7 @@
           <a:p>
             <a:fld id="{B3CCD755-ADF0-0247-AFB5-091D593A0B30}" type="datetime1">
               <a:rPr lang="en-US" smtClean="0"/>
-              <a:t>3/28/17</a:t>
+              <a:t>3/30/17</a:t>
             </a:fld>
             <a:endParaRPr lang="en-US" dirty="0"/>
           </a:p>
@@ -15781,7 +15781,7 @@
           <a:p>
             <a:fld id="{BEC3198B-BFB2-B34A-8309-8E316F54C5CC}" type="datetime1">
               <a:rPr lang="en-US" smtClean="0"/>
-              <a:t>3/28/17</a:t>
+              <a:t>3/30/17</a:t>
             </a:fld>
             <a:endParaRPr lang="en-US" dirty="0"/>
           </a:p>
@@ -15956,7 +15956,7 @@
           <a:p>
             <a:fld id="{506DB83D-5CC2-DC41-9EA7-60FEADFFDA17}" type="datetime1">
               <a:rPr lang="en-US" smtClean="0"/>
-              <a:t>3/28/17</a:t>
+              <a:t>3/30/17</a:t>
             </a:fld>
             <a:endParaRPr lang="en-US" dirty="0"/>
           </a:p>
@@ -16203,7 +16203,7 @@
           <a:p>
             <a:fld id="{8B4D88E6-5C8B-214B-93C3-5859175EB588}" type="datetime1">
               <a:rPr lang="en-US" smtClean="0"/>
-              <a:t>3/28/17</a:t>
+              <a:t>3/30/17</a:t>
             </a:fld>
             <a:endParaRPr lang="en-US" dirty="0"/>
           </a:p>
@@ -16533,7 +16533,7 @@
           <a:p>
             <a:fld id="{44AA6E10-E411-A240-A338-B3A6E7C88E29}" type="datetime1">
               <a:rPr lang="en-US" smtClean="0"/>
-              <a:t>3/28/17</a:t>
+              <a:t>3/30/17</a:t>
             </a:fld>
             <a:endParaRPr lang="en-US" dirty="0"/>
           </a:p>
@@ -16692,7 +16692,7 @@
           <a:p>
             <a:fld id="{F9201628-924E-6947-8103-D29E7F24B145}" type="datetime1">
               <a:rPr lang="en-US" smtClean="0"/>
-              <a:t>3/28/17</a:t>
+              <a:t>3/30/17</a:t>
             </a:fld>
             <a:endParaRPr lang="en-US" dirty="0"/>
           </a:p>
@@ -16882,7 +16882,7 @@
           <a:p>
             <a:fld id="{010DB504-C20C-814E-9B71-5D4A32B33569}" type="datetime1">
               <a:rPr lang="en-US" smtClean="0"/>
-              <a:t>3/28/17</a:t>
+              <a:t>3/30/17</a:t>
             </a:fld>
             <a:endParaRPr lang="en-US" dirty="0"/>
           </a:p>
@@ -17016,7 +17016,7 @@
           <a:p>
             <a:fld id="{E49DF524-3F05-984E-8D5A-A74FF9189340}" type="datetime1">
               <a:rPr lang="en-US" smtClean="0"/>
-              <a:t>3/28/17</a:t>
+              <a:t>3/30/17</a:t>
             </a:fld>
             <a:endParaRPr lang="en-US" dirty="0"/>
           </a:p>
@@ -17153,7 +17153,7 @@
           <a:p>
             <a:fld id="{32CC8613-32AD-954C-8052-A3A192382257}" type="datetime1">
               <a:rPr lang="en-US" smtClean="0"/>
-              <a:t>3/28/17</a:t>
+              <a:t>3/30/17</a:t>
             </a:fld>
             <a:endParaRPr lang="en-US" dirty="0"/>
           </a:p>
@@ -17287,7 +17287,7 @@
           <a:p>
             <a:fld id="{E89997A2-0882-9A41-B5BB-6ECC9567DA24}" type="datetime1">
               <a:rPr lang="en-US" smtClean="0"/>
-              <a:t>3/28/17</a:t>
+              <a:t>3/30/17</a:t>
             </a:fld>
             <a:endParaRPr lang="en-US" dirty="0"/>
           </a:p>
@@ -19689,7 +19689,7 @@
           <a:p>
             <a:fld id="{2174344F-C90D-A449-8092-23260DC06A0F}" type="datetime1">
               <a:rPr lang="en-US" smtClean="0"/>
-              <a:t>3/28/17</a:t>
+              <a:t>3/30/17</a:t>
             </a:fld>
             <a:endParaRPr lang="en-US" dirty="0"/>
           </a:p>
@@ -20108,7 +20108,7 @@
           <a:graphicData uri="http://schemas.openxmlformats.org/presentationml/2006/ole">
             <mc:AlternateContent xmlns:mc="http://schemas.openxmlformats.org/markup-compatibility/2006">
               <mc:Choice xmlns:v="urn:schemas-microsoft-com:vml" Requires="v">
-                <p:oleObj spid="_x0000_s5320" name="think-cell Slide" r:id="rId5" imgW="38100" imgH="38100" progId="TCLayout.ActiveDocument.1">
+                <p:oleObj spid="_x0000_s5322" name="think-cell Slide" r:id="rId5" imgW="38100" imgH="38100" progId="TCLayout.ActiveDocument.1">
                   <p:embed/>
                 </p:oleObj>
               </mc:Choice>
@@ -24703,21 +24703,21 @@
                 <a:gridCol w="1679636">
                   <a:extLst>
                     <a:ext uri="{9D8B030D-6E8A-4147-A177-3AD203B41FA5}">
-                      <a16:colId xmlns="" xmlns:a16="http://schemas.microsoft.com/office/drawing/2014/main" val="20000"/>
+                      <a16:colId xmlns:a16="http://schemas.microsoft.com/office/drawing/2014/main" xmlns="" val="20000"/>
                     </a:ext>
                   </a:extLst>
                 </a:gridCol>
                 <a:gridCol w="3513044">
                   <a:extLst>
                     <a:ext uri="{9D8B030D-6E8A-4147-A177-3AD203B41FA5}">
-                      <a16:colId xmlns="" xmlns:a16="http://schemas.microsoft.com/office/drawing/2014/main" val="3060790854"/>
+                      <a16:colId xmlns:a16="http://schemas.microsoft.com/office/drawing/2014/main" xmlns="" val="3060790854"/>
                     </a:ext>
                   </a:extLst>
                 </a:gridCol>
                 <a:gridCol w="3046252">
                   <a:extLst>
                     <a:ext uri="{9D8B030D-6E8A-4147-A177-3AD203B41FA5}">
-                      <a16:colId xmlns="" xmlns:a16="http://schemas.microsoft.com/office/drawing/2014/main" val="20001"/>
+                      <a16:colId xmlns:a16="http://schemas.microsoft.com/office/drawing/2014/main" xmlns="" val="20001"/>
                     </a:ext>
                   </a:extLst>
                 </a:gridCol>
@@ -24807,7 +24807,7 @@
                 </a:tc>
                 <a:extLst>
                   <a:ext uri="{0D108BD9-81ED-4DB2-BD59-A6C34878D82A}">
-                    <a16:rowId xmlns="" xmlns:a16="http://schemas.microsoft.com/office/drawing/2014/main" val="10000"/>
+                    <a16:rowId xmlns:a16="http://schemas.microsoft.com/office/drawing/2014/main" xmlns="" val="10000"/>
                   </a:ext>
                 </a:extLst>
               </a:tr>
@@ -25414,7 +25414,7 @@
                 </a:tc>
                 <a:extLst>
                   <a:ext uri="{0D108BD9-81ED-4DB2-BD59-A6C34878D82A}">
-                    <a16:rowId xmlns="" xmlns:a16="http://schemas.microsoft.com/office/drawing/2014/main" val="10001"/>
+                    <a16:rowId xmlns:a16="http://schemas.microsoft.com/office/drawing/2014/main" xmlns="" val="10001"/>
                   </a:ext>
                 </a:extLst>
               </a:tr>
@@ -26075,7 +26075,7 @@
                 </a:tc>
                 <a:extLst>
                   <a:ext uri="{0D108BD9-81ED-4DB2-BD59-A6C34878D82A}">
-                    <a16:rowId xmlns="" xmlns:a16="http://schemas.microsoft.com/office/drawing/2014/main" val="10002"/>
+                    <a16:rowId xmlns:a16="http://schemas.microsoft.com/office/drawing/2014/main" xmlns="" val="10002"/>
                   </a:ext>
                 </a:extLst>
               </a:tr>
@@ -32667,14 +32667,14 @@
                 <a:gridCol w="3048000">
                   <a:extLst>
                     <a:ext uri="{9D8B030D-6E8A-4147-A177-3AD203B41FA5}">
-                      <a16:colId xmlns="" xmlns:a16="http://schemas.microsoft.com/office/drawing/2014/main" val="2590453470"/>
+                      <a16:colId xmlns:a16="http://schemas.microsoft.com/office/drawing/2014/main" xmlns="" val="2590453470"/>
                     </a:ext>
                   </a:extLst>
                 </a:gridCol>
                 <a:gridCol w="3048000">
                   <a:extLst>
                     <a:ext uri="{9D8B030D-6E8A-4147-A177-3AD203B41FA5}">
-                      <a16:colId xmlns="" xmlns:a16="http://schemas.microsoft.com/office/drawing/2014/main" val="863222546"/>
+                      <a16:colId xmlns:a16="http://schemas.microsoft.com/office/drawing/2014/main" xmlns="" val="863222546"/>
                     </a:ext>
                   </a:extLst>
                 </a:gridCol>
@@ -32716,7 +32716,7 @@
                 </a:tc>
                 <a:extLst>
                   <a:ext uri="{0D108BD9-81ED-4DB2-BD59-A6C34878D82A}">
-                    <a16:rowId xmlns="" xmlns:a16="http://schemas.microsoft.com/office/drawing/2014/main" val="824732163"/>
+                    <a16:rowId xmlns:a16="http://schemas.microsoft.com/office/drawing/2014/main" xmlns="" val="824732163"/>
                   </a:ext>
                 </a:extLst>
               </a:tr>
@@ -32749,7 +32749,7 @@
                 </a:tc>
                 <a:extLst>
                   <a:ext uri="{0D108BD9-81ED-4DB2-BD59-A6C34878D82A}">
-                    <a16:rowId xmlns="" xmlns:a16="http://schemas.microsoft.com/office/drawing/2014/main" val="91677113"/>
+                    <a16:rowId xmlns:a16="http://schemas.microsoft.com/office/drawing/2014/main" xmlns="" val="91677113"/>
                   </a:ext>
                 </a:extLst>
               </a:tr>
@@ -32782,7 +32782,7 @@
                 </a:tc>
                 <a:extLst>
                   <a:ext uri="{0D108BD9-81ED-4DB2-BD59-A6C34878D82A}">
-                    <a16:rowId xmlns="" xmlns:a16="http://schemas.microsoft.com/office/drawing/2014/main" val="592803785"/>
+                    <a16:rowId xmlns:a16="http://schemas.microsoft.com/office/drawing/2014/main" xmlns="" val="592803785"/>
                   </a:ext>
                 </a:extLst>
               </a:tr>
@@ -32815,7 +32815,7 @@
                 </a:tc>
                 <a:extLst>
                   <a:ext uri="{0D108BD9-81ED-4DB2-BD59-A6C34878D82A}">
-                    <a16:rowId xmlns="" xmlns:a16="http://schemas.microsoft.com/office/drawing/2014/main" val="464157001"/>
+                    <a16:rowId xmlns:a16="http://schemas.microsoft.com/office/drawing/2014/main" xmlns="" val="464157001"/>
                   </a:ext>
                 </a:extLst>
               </a:tr>
@@ -32848,7 +32848,7 @@
                 </a:tc>
                 <a:extLst>
                   <a:ext uri="{0D108BD9-81ED-4DB2-BD59-A6C34878D82A}">
-                    <a16:rowId xmlns="" xmlns:a16="http://schemas.microsoft.com/office/drawing/2014/main" val="1264193907"/>
+                    <a16:rowId xmlns:a16="http://schemas.microsoft.com/office/drawing/2014/main" xmlns="" val="1264193907"/>
                   </a:ext>
                 </a:extLst>
               </a:tr>
@@ -32881,7 +32881,7 @@
                 </a:tc>
                 <a:extLst>
                   <a:ext uri="{0D108BD9-81ED-4DB2-BD59-A6C34878D82A}">
-                    <a16:rowId xmlns="" xmlns:a16="http://schemas.microsoft.com/office/drawing/2014/main" val="1932704166"/>
+                    <a16:rowId xmlns:a16="http://schemas.microsoft.com/office/drawing/2014/main" xmlns="" val="1932704166"/>
                   </a:ext>
                 </a:extLst>
               </a:tr>
@@ -32922,7 +32922,7 @@
                 </a:tc>
                 <a:extLst>
                   <a:ext uri="{0D108BD9-81ED-4DB2-BD59-A6C34878D82A}">
-                    <a16:rowId xmlns="" xmlns:a16="http://schemas.microsoft.com/office/drawing/2014/main" val="3978776233"/>
+                    <a16:rowId xmlns:a16="http://schemas.microsoft.com/office/drawing/2014/main" xmlns="" val="3978776233"/>
                   </a:ext>
                 </a:extLst>
               </a:tr>
@@ -40099,7 +40099,7 @@
           <a:graphicData uri="http://schemas.openxmlformats.org/presentationml/2006/ole">
             <mc:AlternateContent xmlns:mc="http://schemas.openxmlformats.org/markup-compatibility/2006">
               <mc:Choice xmlns:v="urn:schemas-microsoft-com:vml" Requires="v">
-                <p:oleObj spid="_x0000_s1033" name="think-cell Slide" r:id="rId5" imgW="38100" imgH="38100" progId="TCLayout.ActiveDocument.1">
+                <p:oleObj spid="_x0000_s1035" name="think-cell Slide" r:id="rId5" imgW="38100" imgH="38100" progId="TCLayout.ActiveDocument.1">
                   <p:embed/>
                 </p:oleObj>
               </mc:Choice>
@@ -41300,14 +41300,14 @@
                 <a:gridCol w="3624799">
                   <a:extLst>
                     <a:ext uri="{9D8B030D-6E8A-4147-A177-3AD203B41FA5}">
-                      <a16:colId xmlns="" xmlns:a16="http://schemas.microsoft.com/office/drawing/2014/main" val="20000"/>
+                      <a16:colId xmlns:a16="http://schemas.microsoft.com/office/drawing/2014/main" xmlns="" val="20000"/>
                     </a:ext>
                   </a:extLst>
                 </a:gridCol>
                 <a:gridCol w="4376201">
                   <a:extLst>
                     <a:ext uri="{9D8B030D-6E8A-4147-A177-3AD203B41FA5}">
-                      <a16:colId xmlns="" xmlns:a16="http://schemas.microsoft.com/office/drawing/2014/main" val="20001"/>
+                      <a16:colId xmlns:a16="http://schemas.microsoft.com/office/drawing/2014/main" xmlns="" val="20001"/>
                     </a:ext>
                   </a:extLst>
                 </a:gridCol>
@@ -41341,7 +41341,7 @@
                 </a:tc>
                 <a:extLst>
                   <a:ext uri="{0D108BD9-81ED-4DB2-BD59-A6C34878D82A}">
-                    <a16:rowId xmlns="" xmlns:a16="http://schemas.microsoft.com/office/drawing/2014/main" val="10000"/>
+                    <a16:rowId xmlns:a16="http://schemas.microsoft.com/office/drawing/2014/main" xmlns="" val="10000"/>
                   </a:ext>
                 </a:extLst>
               </a:tr>
@@ -41374,7 +41374,7 @@
                 </a:tc>
                 <a:extLst>
                   <a:ext uri="{0D108BD9-81ED-4DB2-BD59-A6C34878D82A}">
-                    <a16:rowId xmlns="" xmlns:a16="http://schemas.microsoft.com/office/drawing/2014/main" val="10001"/>
+                    <a16:rowId xmlns:a16="http://schemas.microsoft.com/office/drawing/2014/main" xmlns="" val="10001"/>
                   </a:ext>
                 </a:extLst>
               </a:tr>
@@ -41423,7 +41423,7 @@
                 </a:tc>
                 <a:extLst>
                   <a:ext uri="{0D108BD9-81ED-4DB2-BD59-A6C34878D82A}">
-                    <a16:rowId xmlns="" xmlns:a16="http://schemas.microsoft.com/office/drawing/2014/main" val="10002"/>
+                    <a16:rowId xmlns:a16="http://schemas.microsoft.com/office/drawing/2014/main" xmlns="" val="10002"/>
                   </a:ext>
                 </a:extLst>
               </a:tr>
@@ -41456,7 +41456,7 @@
                 </a:tc>
                 <a:extLst>
                   <a:ext uri="{0D108BD9-81ED-4DB2-BD59-A6C34878D82A}">
-                    <a16:rowId xmlns="" xmlns:a16="http://schemas.microsoft.com/office/drawing/2014/main" val="10003"/>
+                    <a16:rowId xmlns:a16="http://schemas.microsoft.com/office/drawing/2014/main" xmlns="" val="10003"/>
                   </a:ext>
                 </a:extLst>
               </a:tr>
@@ -41489,7 +41489,7 @@
                 </a:tc>
                 <a:extLst>
                   <a:ext uri="{0D108BD9-81ED-4DB2-BD59-A6C34878D82A}">
-                    <a16:rowId xmlns="" xmlns:a16="http://schemas.microsoft.com/office/drawing/2014/main" val="10004"/>
+                    <a16:rowId xmlns:a16="http://schemas.microsoft.com/office/drawing/2014/main" xmlns="" val="10004"/>
                   </a:ext>
                 </a:extLst>
               </a:tr>
@@ -41522,7 +41522,7 @@
                 </a:tc>
                 <a:extLst>
                   <a:ext uri="{0D108BD9-81ED-4DB2-BD59-A6C34878D82A}">
-                    <a16:rowId xmlns="" xmlns:a16="http://schemas.microsoft.com/office/drawing/2014/main" val="10005"/>
+                    <a16:rowId xmlns:a16="http://schemas.microsoft.com/office/drawing/2014/main" xmlns="" val="10005"/>
                   </a:ext>
                 </a:extLst>
               </a:tr>
@@ -41555,7 +41555,7 @@
                 </a:tc>
                 <a:extLst>
                   <a:ext uri="{0D108BD9-81ED-4DB2-BD59-A6C34878D82A}">
-                    <a16:rowId xmlns="" xmlns:a16="http://schemas.microsoft.com/office/drawing/2014/main" val="10006"/>
+                    <a16:rowId xmlns:a16="http://schemas.microsoft.com/office/drawing/2014/main" xmlns="" val="10006"/>
                   </a:ext>
                 </a:extLst>
               </a:tr>
@@ -41588,7 +41588,7 @@
                 </a:tc>
                 <a:extLst>
                   <a:ext uri="{0D108BD9-81ED-4DB2-BD59-A6C34878D82A}">
-                    <a16:rowId xmlns="" xmlns:a16="http://schemas.microsoft.com/office/drawing/2014/main" val="10007"/>
+                    <a16:rowId xmlns:a16="http://schemas.microsoft.com/office/drawing/2014/main" xmlns="" val="10007"/>
                   </a:ext>
                 </a:extLst>
               </a:tr>
@@ -41621,7 +41621,7 @@
                 </a:tc>
                 <a:extLst>
                   <a:ext uri="{0D108BD9-81ED-4DB2-BD59-A6C34878D82A}">
-                    <a16:rowId xmlns="" xmlns:a16="http://schemas.microsoft.com/office/drawing/2014/main" val="10008"/>
+                    <a16:rowId xmlns:a16="http://schemas.microsoft.com/office/drawing/2014/main" xmlns="" val="10008"/>
                   </a:ext>
                 </a:extLst>
               </a:tr>
@@ -41654,7 +41654,7 @@
                 </a:tc>
                 <a:extLst>
                   <a:ext uri="{0D108BD9-81ED-4DB2-BD59-A6C34878D82A}">
-                    <a16:rowId xmlns="" xmlns:a16="http://schemas.microsoft.com/office/drawing/2014/main" val="10009"/>
+                    <a16:rowId xmlns:a16="http://schemas.microsoft.com/office/drawing/2014/main" xmlns="" val="10009"/>
                   </a:ext>
                 </a:extLst>
               </a:tr>
@@ -41687,7 +41687,7 @@
                 </a:tc>
                 <a:extLst>
                   <a:ext uri="{0D108BD9-81ED-4DB2-BD59-A6C34878D82A}">
-                    <a16:rowId xmlns="" xmlns:a16="http://schemas.microsoft.com/office/drawing/2014/main" val="10010"/>
+                    <a16:rowId xmlns:a16="http://schemas.microsoft.com/office/drawing/2014/main" xmlns="" val="10010"/>
                   </a:ext>
                 </a:extLst>
               </a:tr>
@@ -41720,7 +41720,7 @@
                 </a:tc>
                 <a:extLst>
                   <a:ext uri="{0D108BD9-81ED-4DB2-BD59-A6C34878D82A}">
-                    <a16:rowId xmlns="" xmlns:a16="http://schemas.microsoft.com/office/drawing/2014/main" val="10011"/>
+                    <a16:rowId xmlns:a16="http://schemas.microsoft.com/office/drawing/2014/main" xmlns="" val="10011"/>
                   </a:ext>
                 </a:extLst>
               </a:tr>
@@ -41753,7 +41753,7 @@
                 </a:tc>
                 <a:extLst>
                   <a:ext uri="{0D108BD9-81ED-4DB2-BD59-A6C34878D82A}">
-                    <a16:rowId xmlns="" xmlns:a16="http://schemas.microsoft.com/office/drawing/2014/main" val="10012"/>
+                    <a16:rowId xmlns:a16="http://schemas.microsoft.com/office/drawing/2014/main" xmlns="" val="10012"/>
                   </a:ext>
                 </a:extLst>
               </a:tr>
@@ -41786,7 +41786,7 @@
                 </a:tc>
                 <a:extLst>
                   <a:ext uri="{0D108BD9-81ED-4DB2-BD59-A6C34878D82A}">
-                    <a16:rowId xmlns="" xmlns:a16="http://schemas.microsoft.com/office/drawing/2014/main" val="10013"/>
+                    <a16:rowId xmlns:a16="http://schemas.microsoft.com/office/drawing/2014/main" xmlns="" val="10013"/>
                   </a:ext>
                 </a:extLst>
               </a:tr>
@@ -41819,7 +41819,7 @@
                 </a:tc>
                 <a:extLst>
                   <a:ext uri="{0D108BD9-81ED-4DB2-BD59-A6C34878D82A}">
-                    <a16:rowId xmlns="" xmlns:a16="http://schemas.microsoft.com/office/drawing/2014/main" val="10014"/>
+                    <a16:rowId xmlns:a16="http://schemas.microsoft.com/office/drawing/2014/main" xmlns="" val="10014"/>
                   </a:ext>
                 </a:extLst>
               </a:tr>
@@ -41852,7 +41852,7 @@
                 </a:tc>
                 <a:extLst>
                   <a:ext uri="{0D108BD9-81ED-4DB2-BD59-A6C34878D82A}">
-                    <a16:rowId xmlns="" xmlns:a16="http://schemas.microsoft.com/office/drawing/2014/main" val="10015"/>
+                    <a16:rowId xmlns:a16="http://schemas.microsoft.com/office/drawing/2014/main" xmlns="" val="10015"/>
                   </a:ext>
                 </a:extLst>
               </a:tr>
@@ -41885,7 +41885,7 @@
                 </a:tc>
                 <a:extLst>
                   <a:ext uri="{0D108BD9-81ED-4DB2-BD59-A6C34878D82A}">
-                    <a16:rowId xmlns="" xmlns:a16="http://schemas.microsoft.com/office/drawing/2014/main" val="10016"/>
+                    <a16:rowId xmlns:a16="http://schemas.microsoft.com/office/drawing/2014/main" xmlns="" val="10016"/>
                   </a:ext>
                 </a:extLst>
               </a:tr>
@@ -41937,7 +41937,7 @@
                 </a:tc>
                 <a:extLst>
                   <a:ext uri="{0D108BD9-81ED-4DB2-BD59-A6C34878D82A}">
-                    <a16:rowId xmlns="" xmlns:a16="http://schemas.microsoft.com/office/drawing/2014/main" val="10017"/>
+                    <a16:rowId xmlns:a16="http://schemas.microsoft.com/office/drawing/2014/main" xmlns="" val="10017"/>
                   </a:ext>
                 </a:extLst>
               </a:tr>
@@ -41970,7 +41970,7 @@
                 </a:tc>
                 <a:extLst>
                   <a:ext uri="{0D108BD9-81ED-4DB2-BD59-A6C34878D82A}">
-                    <a16:rowId xmlns="" xmlns:a16="http://schemas.microsoft.com/office/drawing/2014/main" val="10018"/>
+                    <a16:rowId xmlns:a16="http://schemas.microsoft.com/office/drawing/2014/main" xmlns="" val="10018"/>
                   </a:ext>
                 </a:extLst>
               </a:tr>
@@ -42003,7 +42003,7 @@
                 </a:tc>
                 <a:extLst>
                   <a:ext uri="{0D108BD9-81ED-4DB2-BD59-A6C34878D82A}">
-                    <a16:rowId xmlns="" xmlns:a16="http://schemas.microsoft.com/office/drawing/2014/main" val="10019"/>
+                    <a16:rowId xmlns:a16="http://schemas.microsoft.com/office/drawing/2014/main" xmlns="" val="10019"/>
                   </a:ext>
                 </a:extLst>
               </a:tr>
@@ -42055,7 +42055,7 @@
                 </a:tc>
                 <a:extLst>
                   <a:ext uri="{0D108BD9-81ED-4DB2-BD59-A6C34878D82A}">
-                    <a16:rowId xmlns="" xmlns:a16="http://schemas.microsoft.com/office/drawing/2014/main" val="10020"/>
+                    <a16:rowId xmlns:a16="http://schemas.microsoft.com/office/drawing/2014/main" xmlns="" val="10020"/>
                   </a:ext>
                 </a:extLst>
               </a:tr>
@@ -42107,7 +42107,7 @@
                 </a:tc>
                 <a:extLst>
                   <a:ext uri="{0D108BD9-81ED-4DB2-BD59-A6C34878D82A}">
-                    <a16:rowId xmlns="" xmlns:a16="http://schemas.microsoft.com/office/drawing/2014/main" val="10021"/>
+                    <a16:rowId xmlns:a16="http://schemas.microsoft.com/office/drawing/2014/main" xmlns="" val="10021"/>
                   </a:ext>
                 </a:extLst>
               </a:tr>
@@ -42159,7 +42159,7 @@
                 </a:tc>
                 <a:extLst>
                   <a:ext uri="{0D108BD9-81ED-4DB2-BD59-A6C34878D82A}">
-                    <a16:rowId xmlns="" xmlns:a16="http://schemas.microsoft.com/office/drawing/2014/main" val="10022"/>
+                    <a16:rowId xmlns:a16="http://schemas.microsoft.com/office/drawing/2014/main" xmlns="" val="10022"/>
                   </a:ext>
                 </a:extLst>
               </a:tr>
@@ -42211,7 +42211,7 @@
                 </a:tc>
                 <a:extLst>
                   <a:ext uri="{0D108BD9-81ED-4DB2-BD59-A6C34878D82A}">
-                    <a16:rowId xmlns="" xmlns:a16="http://schemas.microsoft.com/office/drawing/2014/main" val="10023"/>
+                    <a16:rowId xmlns:a16="http://schemas.microsoft.com/office/drawing/2014/main" xmlns="" val="10023"/>
                   </a:ext>
                 </a:extLst>
               </a:tr>
@@ -42542,21 +42542,21 @@
                 <a:gridCol w="1679636">
                   <a:extLst>
                     <a:ext uri="{9D8B030D-6E8A-4147-A177-3AD203B41FA5}">
-                      <a16:colId xmlns="" xmlns:a16="http://schemas.microsoft.com/office/drawing/2014/main" val="20000"/>
+                      <a16:colId xmlns:a16="http://schemas.microsoft.com/office/drawing/2014/main" xmlns="" val="20000"/>
                     </a:ext>
                   </a:extLst>
                 </a:gridCol>
                 <a:gridCol w="3513044">
                   <a:extLst>
                     <a:ext uri="{9D8B030D-6E8A-4147-A177-3AD203B41FA5}">
-                      <a16:colId xmlns="" xmlns:a16="http://schemas.microsoft.com/office/drawing/2014/main" val="3060790854"/>
+                      <a16:colId xmlns:a16="http://schemas.microsoft.com/office/drawing/2014/main" xmlns="" val="3060790854"/>
                     </a:ext>
                   </a:extLst>
                 </a:gridCol>
                 <a:gridCol w="3046252">
                   <a:extLst>
                     <a:ext uri="{9D8B030D-6E8A-4147-A177-3AD203B41FA5}">
-                      <a16:colId xmlns="" xmlns:a16="http://schemas.microsoft.com/office/drawing/2014/main" val="20001"/>
+                      <a16:colId xmlns:a16="http://schemas.microsoft.com/office/drawing/2014/main" xmlns="" val="20001"/>
                     </a:ext>
                   </a:extLst>
                 </a:gridCol>
@@ -42646,7 +42646,7 @@
                 </a:tc>
                 <a:extLst>
                   <a:ext uri="{0D108BD9-81ED-4DB2-BD59-A6C34878D82A}">
-                    <a16:rowId xmlns="" xmlns:a16="http://schemas.microsoft.com/office/drawing/2014/main" val="10000"/>
+                    <a16:rowId xmlns:a16="http://schemas.microsoft.com/office/drawing/2014/main" xmlns="" val="10000"/>
                   </a:ext>
                 </a:extLst>
               </a:tr>
@@ -43519,7 +43519,7 @@
                 </a:tc>
                 <a:extLst>
                   <a:ext uri="{0D108BD9-81ED-4DB2-BD59-A6C34878D82A}">
-                    <a16:rowId xmlns="" xmlns:a16="http://schemas.microsoft.com/office/drawing/2014/main" val="10001"/>
+                    <a16:rowId xmlns:a16="http://schemas.microsoft.com/office/drawing/2014/main" xmlns="" val="10001"/>
                   </a:ext>
                 </a:extLst>
               </a:tr>
@@ -44144,7 +44144,7 @@
                 </a:tc>
                 <a:extLst>
                   <a:ext uri="{0D108BD9-81ED-4DB2-BD59-A6C34878D82A}">
-                    <a16:rowId xmlns="" xmlns:a16="http://schemas.microsoft.com/office/drawing/2014/main" val="10002"/>
+                    <a16:rowId xmlns:a16="http://schemas.microsoft.com/office/drawing/2014/main" xmlns="" val="10002"/>
                   </a:ext>
                 </a:extLst>
               </a:tr>

</xml_diff>